<commit_message>
final commit before class
</commit_message>
<xml_diff>
--- a/presentation/Digital Communications with Arduino.pptx
+++ b/presentation/Digital Communications with Arduino.pptx
@@ -158,6 +158,11 @@
       </a:defRPr>
     </a:lvl9pPr>
   </p:defaultTextStyle>
+  <p:extLst>
+    <p:ext uri="{EFAFB233-063F-42B5-8137-9DF3F51BA10A}">
+      <p15:sldGuideLst xmlns:p15="http://schemas.microsoft.com/office/powerpoint/2012/main"/>
+    </p:ext>
+  </p:extLst>
 </p:presentation>
 </file>
 
@@ -292,7 +297,7 @@
           <a:p>
             <a:fld id="{3BF9D0E9-12B3-4B24-9036-A534ED9C39D4}" type="datetimeFigureOut">
               <a:rPr lang="en-US" smtClean="0"/>
-              <a:t>2/21/2015</a:t>
+              <a:t>2/28/2015</a:t>
             </a:fld>
             <a:endParaRPr lang="en-US"/>
           </a:p>
@@ -462,7 +467,7 @@
           <a:p>
             <a:fld id="{3BF9D0E9-12B3-4B24-9036-A534ED9C39D4}" type="datetimeFigureOut">
               <a:rPr lang="en-US" smtClean="0"/>
-              <a:t>2/21/2015</a:t>
+              <a:t>2/28/2015</a:t>
             </a:fld>
             <a:endParaRPr lang="en-US"/>
           </a:p>
@@ -642,7 +647,7 @@
           <a:p>
             <a:fld id="{3BF9D0E9-12B3-4B24-9036-A534ED9C39D4}" type="datetimeFigureOut">
               <a:rPr lang="en-US" smtClean="0"/>
-              <a:t>2/21/2015</a:t>
+              <a:t>2/28/2015</a:t>
             </a:fld>
             <a:endParaRPr lang="en-US"/>
           </a:p>
@@ -812,7 +817,7 @@
           <a:p>
             <a:fld id="{3BF9D0E9-12B3-4B24-9036-A534ED9C39D4}" type="datetimeFigureOut">
               <a:rPr lang="en-US" smtClean="0"/>
-              <a:t>2/21/2015</a:t>
+              <a:t>2/28/2015</a:t>
             </a:fld>
             <a:endParaRPr lang="en-US"/>
           </a:p>
@@ -1058,7 +1063,7 @@
           <a:p>
             <a:fld id="{3BF9D0E9-12B3-4B24-9036-A534ED9C39D4}" type="datetimeFigureOut">
               <a:rPr lang="en-US" smtClean="0"/>
-              <a:t>2/21/2015</a:t>
+              <a:t>2/28/2015</a:t>
             </a:fld>
             <a:endParaRPr lang="en-US"/>
           </a:p>
@@ -1290,7 +1295,7 @@
           <a:p>
             <a:fld id="{3BF9D0E9-12B3-4B24-9036-A534ED9C39D4}" type="datetimeFigureOut">
               <a:rPr lang="en-US" smtClean="0"/>
-              <a:t>2/21/2015</a:t>
+              <a:t>2/28/2015</a:t>
             </a:fld>
             <a:endParaRPr lang="en-US"/>
           </a:p>
@@ -1657,7 +1662,7 @@
           <a:p>
             <a:fld id="{3BF9D0E9-12B3-4B24-9036-A534ED9C39D4}" type="datetimeFigureOut">
               <a:rPr lang="en-US" smtClean="0"/>
-              <a:t>2/21/2015</a:t>
+              <a:t>2/28/2015</a:t>
             </a:fld>
             <a:endParaRPr lang="en-US"/>
           </a:p>
@@ -1775,7 +1780,7 @@
           <a:p>
             <a:fld id="{3BF9D0E9-12B3-4B24-9036-A534ED9C39D4}" type="datetimeFigureOut">
               <a:rPr lang="en-US" smtClean="0"/>
-              <a:t>2/21/2015</a:t>
+              <a:t>2/28/2015</a:t>
             </a:fld>
             <a:endParaRPr lang="en-US"/>
           </a:p>
@@ -1870,7 +1875,7 @@
           <a:p>
             <a:fld id="{3BF9D0E9-12B3-4B24-9036-A534ED9C39D4}" type="datetimeFigureOut">
               <a:rPr lang="en-US" smtClean="0"/>
-              <a:t>2/21/2015</a:t>
+              <a:t>2/28/2015</a:t>
             </a:fld>
             <a:endParaRPr lang="en-US"/>
           </a:p>
@@ -2147,7 +2152,7 @@
           <a:p>
             <a:fld id="{3BF9D0E9-12B3-4B24-9036-A534ED9C39D4}" type="datetimeFigureOut">
               <a:rPr lang="en-US" smtClean="0"/>
-              <a:t>2/21/2015</a:t>
+              <a:t>2/28/2015</a:t>
             </a:fld>
             <a:endParaRPr lang="en-US"/>
           </a:p>
@@ -2400,7 +2405,7 @@
           <a:p>
             <a:fld id="{3BF9D0E9-12B3-4B24-9036-A534ED9C39D4}" type="datetimeFigureOut">
               <a:rPr lang="en-US" smtClean="0"/>
-              <a:t>2/21/2015</a:t>
+              <a:t>2/28/2015</a:t>
             </a:fld>
             <a:endParaRPr lang="en-US"/>
           </a:p>
@@ -2613,7 +2618,7 @@
           <a:p>
             <a:fld id="{3BF9D0E9-12B3-4B24-9036-A534ED9C39D4}" type="datetimeFigureOut">
               <a:rPr lang="en-US" smtClean="0"/>
-              <a:t>2/21/2015</a:t>
+              <a:t>2/28/2015</a:t>
             </a:fld>
             <a:endParaRPr lang="en-US"/>
           </a:p>
@@ -3970,11 +3975,7 @@
             <a:pPr lvl="1"/>
             <a:r>
               <a:rPr lang="en-US" dirty="0" smtClean="0"/>
-              <a:t>‘Z’ shifts a 0 </a:t>
-            </a:r>
-            <a:r>
-              <a:rPr lang="en-US" dirty="0" smtClean="0"/>
-              <a:t>into the shift register and strobes RCLK</a:t>
+              <a:t>‘Z’ shifts a 0 into the shift register and strobes RCLK</a:t>
             </a:r>
           </a:p>
           <a:p>
@@ -3983,7 +3984,6 @@
               <a:rPr lang="en-US" dirty="0" smtClean="0"/>
               <a:t>‘r’ strobes RCLK</a:t>
             </a:r>
-            <a:endParaRPr lang="en-US" dirty="0" smtClean="0"/>
           </a:p>
           <a:p>
             <a:pPr lvl="1"/>
@@ -4281,7 +4281,6 @@
               <a:rPr lang="en-US" dirty="0" smtClean="0"/>
               <a:t>Twenty 470 ohm resistors</a:t>
             </a:r>
-            <a:endParaRPr lang="en-US" dirty="0" smtClean="0"/>
           </a:p>
           <a:p>
             <a:r>
@@ -6090,25 +6089,35 @@
           </a:p>
         </p:txBody>
       </p:sp>
-      <p:sp>
-        <p:nvSpPr>
-          <p:cNvPr id="3" name="Content Placeholder 2"/>
-          <p:cNvSpPr>
-            <a:spLocks noGrp="1"/>
-          </p:cNvSpPr>
+      <p:pic>
+        <p:nvPicPr>
+          <p:cNvPr id="4" name="Content Placeholder 3"/>
+          <p:cNvPicPr>
+            <a:picLocks noGrp="1" noChangeAspect="1"/>
+          </p:cNvPicPr>
           <p:nvPr>
             <p:ph idx="1"/>
           </p:nvPr>
-        </p:nvSpPr>
-        <p:spPr/>
-        <p:txBody>
-          <a:bodyPr/>
-          <a:lstStyle/>
-          <a:p>
-            <a:endParaRPr lang="en-US"/>
-          </a:p>
-        </p:txBody>
-      </p:sp>
+        </p:nvPicPr>
+        <p:blipFill>
+          <a:blip r:embed="rId2">
+            <a:extLst>
+              <a:ext uri="{28A0092B-C50C-407E-A947-70E740481C1C}">
+                <a14:useLocalDpi xmlns:a14="http://schemas.microsoft.com/office/drawing/2010/main" val="0"/>
+              </a:ext>
+            </a:extLst>
+          </a:blip>
+          <a:stretch>
+            <a:fillRect/>
+          </a:stretch>
+        </p:blipFill>
+        <p:spPr>
+          <a:xfrm>
+            <a:off x="1768415" y="1690689"/>
+            <a:ext cx="8233120" cy="4870904"/>
+          </a:xfrm>
+        </p:spPr>
+      </p:pic>
     </p:spTree>
     <p:extLst>
       <p:ext uri="{BB962C8B-B14F-4D97-AF65-F5344CB8AC3E}">
@@ -6169,25 +6178,35 @@
           </a:p>
         </p:txBody>
       </p:sp>
-      <p:sp>
-        <p:nvSpPr>
-          <p:cNvPr id="3" name="Content Placeholder 2"/>
-          <p:cNvSpPr>
-            <a:spLocks noGrp="1"/>
-          </p:cNvSpPr>
+      <p:pic>
+        <p:nvPicPr>
+          <p:cNvPr id="4" name="Content Placeholder 3"/>
+          <p:cNvPicPr>
+            <a:picLocks noGrp="1" noChangeAspect="1"/>
+          </p:cNvPicPr>
           <p:nvPr>
             <p:ph idx="1"/>
           </p:nvPr>
-        </p:nvSpPr>
-        <p:spPr/>
-        <p:txBody>
-          <a:bodyPr/>
-          <a:lstStyle/>
-          <a:p>
-            <a:endParaRPr lang="en-US"/>
-          </a:p>
-        </p:txBody>
-      </p:sp>
+        </p:nvPicPr>
+        <p:blipFill>
+          <a:blip r:embed="rId2">
+            <a:extLst>
+              <a:ext uri="{28A0092B-C50C-407E-A947-70E740481C1C}">
+                <a14:useLocalDpi xmlns:a14="http://schemas.microsoft.com/office/drawing/2010/main" val="0"/>
+              </a:ext>
+            </a:extLst>
+          </a:blip>
+          <a:stretch>
+            <a:fillRect/>
+          </a:stretch>
+        </p:blipFill>
+        <p:spPr>
+          <a:xfrm>
+            <a:off x="2353388" y="1466492"/>
+            <a:ext cx="7370213" cy="5149968"/>
+          </a:xfrm>
+        </p:spPr>
+      </p:pic>
     </p:spTree>
     <p:extLst>
       <p:ext uri="{BB962C8B-B14F-4D97-AF65-F5344CB8AC3E}">
@@ -6248,25 +6267,35 @@
           </a:p>
         </p:txBody>
       </p:sp>
-      <p:sp>
-        <p:nvSpPr>
-          <p:cNvPr id="3" name="Content Placeholder 2"/>
-          <p:cNvSpPr>
-            <a:spLocks noGrp="1"/>
-          </p:cNvSpPr>
+      <p:pic>
+        <p:nvPicPr>
+          <p:cNvPr id="4" name="Content Placeholder 3"/>
+          <p:cNvPicPr>
+            <a:picLocks noGrp="1" noChangeAspect="1"/>
+          </p:cNvPicPr>
           <p:nvPr>
             <p:ph idx="1"/>
           </p:nvPr>
-        </p:nvSpPr>
-        <p:spPr/>
-        <p:txBody>
-          <a:bodyPr/>
-          <a:lstStyle/>
-          <a:p>
-            <a:endParaRPr lang="en-US"/>
-          </a:p>
-        </p:txBody>
-      </p:sp>
+        </p:nvPicPr>
+        <p:blipFill>
+          <a:blip r:embed="rId2">
+            <a:extLst>
+              <a:ext uri="{28A0092B-C50C-407E-A947-70E740481C1C}">
+                <a14:useLocalDpi xmlns:a14="http://schemas.microsoft.com/office/drawing/2010/main" val="0"/>
+              </a:ext>
+            </a:extLst>
+          </a:blip>
+          <a:stretch>
+            <a:fillRect/>
+          </a:stretch>
+        </p:blipFill>
+        <p:spPr>
+          <a:xfrm>
+            <a:off x="543607" y="1690688"/>
+            <a:ext cx="11140133" cy="4606595"/>
+          </a:xfrm>
+        </p:spPr>
+      </p:pic>
     </p:spTree>
     <p:extLst>
       <p:ext uri="{BB962C8B-B14F-4D97-AF65-F5344CB8AC3E}">
@@ -7605,29 +7634,55 @@
           <a:bodyPr/>
           <a:lstStyle/>
           <a:p>
-            <a:endParaRPr lang="en-US"/>
-          </a:p>
-        </p:txBody>
-      </p:sp>
-      <p:sp>
-        <p:nvSpPr>
-          <p:cNvPr id="3" name="Content Placeholder 2"/>
-          <p:cNvSpPr>
-            <a:spLocks noGrp="1"/>
-          </p:cNvSpPr>
+            <a:r>
+              <a:rPr lang="en-US" dirty="0"/>
+              <a:t>I</a:t>
+            </a:r>
+            <a:r>
+              <a:rPr lang="en-US" baseline="30000" dirty="0"/>
+              <a:t>2</a:t>
+            </a:r>
+            <a:r>
+              <a:rPr lang="en-US" dirty="0"/>
+              <a:t>C </a:t>
+            </a:r>
+            <a:r>
+              <a:rPr lang="en-US" dirty="0" smtClean="0"/>
+              <a:t>reading code</a:t>
+            </a:r>
+            <a:endParaRPr lang="en-US" dirty="0"/>
+          </a:p>
+        </p:txBody>
+      </p:sp>
+      <p:pic>
+        <p:nvPicPr>
+          <p:cNvPr id="4" name="Content Placeholder 3"/>
+          <p:cNvPicPr>
+            <a:picLocks noGrp="1" noChangeAspect="1"/>
+          </p:cNvPicPr>
           <p:nvPr>
             <p:ph idx="1"/>
           </p:nvPr>
-        </p:nvSpPr>
-        <p:spPr/>
-        <p:txBody>
-          <a:bodyPr/>
-          <a:lstStyle/>
-          <a:p>
-            <a:endParaRPr lang="en-US"/>
-          </a:p>
-        </p:txBody>
-      </p:sp>
+        </p:nvPicPr>
+        <p:blipFill>
+          <a:blip r:embed="rId2">
+            <a:extLst>
+              <a:ext uri="{28A0092B-C50C-407E-A947-70E740481C1C}">
+                <a14:useLocalDpi xmlns:a14="http://schemas.microsoft.com/office/drawing/2010/main" val="0"/>
+              </a:ext>
+            </a:extLst>
+          </a:blip>
+          <a:stretch>
+            <a:fillRect/>
+          </a:stretch>
+        </p:blipFill>
+        <p:spPr>
+          <a:xfrm>
+            <a:off x="495540" y="1906439"/>
+            <a:ext cx="12294887" cy="3847380"/>
+          </a:xfrm>
+        </p:spPr>
+      </p:pic>
     </p:spTree>
     <p:extLst>
       <p:ext uri="{BB962C8B-B14F-4D97-AF65-F5344CB8AC3E}">
@@ -7836,29 +7891,55 @@
           <a:bodyPr/>
           <a:lstStyle/>
           <a:p>
-            <a:endParaRPr lang="en-US"/>
-          </a:p>
-        </p:txBody>
-      </p:sp>
-      <p:sp>
-        <p:nvSpPr>
-          <p:cNvPr id="3" name="Content Placeholder 2"/>
-          <p:cNvSpPr>
-            <a:spLocks noGrp="1"/>
-          </p:cNvSpPr>
+            <a:r>
+              <a:rPr lang="en-US" dirty="0"/>
+              <a:t>I</a:t>
+            </a:r>
+            <a:r>
+              <a:rPr lang="en-US" baseline="30000" dirty="0"/>
+              <a:t>2</a:t>
+            </a:r>
+            <a:r>
+              <a:rPr lang="en-US" dirty="0"/>
+              <a:t>C </a:t>
+            </a:r>
+            <a:r>
+              <a:rPr lang="en-US" dirty="0" smtClean="0"/>
+              <a:t>writing code</a:t>
+            </a:r>
+            <a:endParaRPr lang="en-US" dirty="0"/>
+          </a:p>
+        </p:txBody>
+      </p:sp>
+      <p:pic>
+        <p:nvPicPr>
+          <p:cNvPr id="4" name="Content Placeholder 3"/>
+          <p:cNvPicPr>
+            <a:picLocks noGrp="1" noChangeAspect="1"/>
+          </p:cNvPicPr>
           <p:nvPr>
             <p:ph idx="1"/>
           </p:nvPr>
-        </p:nvSpPr>
-        <p:spPr/>
-        <p:txBody>
-          <a:bodyPr/>
-          <a:lstStyle/>
-          <a:p>
-            <a:endParaRPr lang="en-US"/>
-          </a:p>
-        </p:txBody>
-      </p:sp>
+        </p:nvPicPr>
+        <p:blipFill>
+          <a:blip r:embed="rId2">
+            <a:extLst>
+              <a:ext uri="{28A0092B-C50C-407E-A947-70E740481C1C}">
+                <a14:useLocalDpi xmlns:a14="http://schemas.microsoft.com/office/drawing/2010/main" val="0"/>
+              </a:ext>
+            </a:extLst>
+          </a:blip>
+          <a:stretch>
+            <a:fillRect/>
+          </a:stretch>
+        </p:blipFill>
+        <p:spPr>
+          <a:xfrm>
+            <a:off x="238664" y="2463945"/>
+            <a:ext cx="11714672" cy="2875805"/>
+          </a:xfrm>
+        </p:spPr>
+      </p:pic>
     </p:spTree>
     <p:extLst>
       <p:ext uri="{BB962C8B-B14F-4D97-AF65-F5344CB8AC3E}">
@@ -8153,7 +8234,6 @@
               <a:rPr lang="en-US" dirty="0" smtClean="0"/>
               <a:t>Standard Arduino framing is 1 start bit followed by 8 data bits, no parity bits, and one stop bit (abbreviated 8N1), so about 80% of the transmitted bits are available for data.</a:t>
             </a:r>
-            <a:endParaRPr lang="en-US" dirty="0" smtClean="0"/>
           </a:p>
           <a:p>
             <a:endParaRPr lang="en-US" dirty="0"/>
@@ -8619,7 +8699,6 @@
               <a:rPr lang="en-US" dirty="0" smtClean="0"/>
               <a:t>Try moving the two sides apart. </a:t>
             </a:r>
-            <a:endParaRPr lang="en-US" dirty="0" smtClean="0"/>
           </a:p>
           <a:p>
             <a:endParaRPr lang="en-US" dirty="0"/>
@@ -8686,25 +8765,63 @@
           </a:p>
         </p:txBody>
       </p:sp>
-      <p:sp>
-        <p:nvSpPr>
-          <p:cNvPr id="3" name="Content Placeholder 2"/>
-          <p:cNvSpPr>
-            <a:spLocks noGrp="1"/>
-          </p:cNvSpPr>
+      <p:pic>
+        <p:nvPicPr>
+          <p:cNvPr id="4" name="Content Placeholder 3"/>
+          <p:cNvPicPr>
+            <a:picLocks noGrp="1" noChangeAspect="1"/>
+          </p:cNvPicPr>
           <p:nvPr>
             <p:ph idx="1"/>
           </p:nvPr>
-        </p:nvSpPr>
-        <p:spPr/>
-        <p:txBody>
-          <a:bodyPr/>
-          <a:lstStyle/>
-          <a:p>
-            <a:endParaRPr lang="en-US"/>
-          </a:p>
-        </p:txBody>
-      </p:sp>
+        </p:nvPicPr>
+        <p:blipFill rotWithShape="1">
+          <a:blip r:embed="rId2">
+            <a:extLst>
+              <a:ext uri="{28A0092B-C50C-407E-A947-70E740481C1C}">
+                <a14:useLocalDpi xmlns:a14="http://schemas.microsoft.com/office/drawing/2010/main" val="0"/>
+              </a:ext>
+            </a:extLst>
+          </a:blip>
+          <a:srcRect r="64276"/>
+          <a:stretch/>
+        </p:blipFill>
+        <p:spPr>
+          <a:xfrm>
+            <a:off x="303616" y="1690688"/>
+            <a:ext cx="3947542" cy="4341144"/>
+          </a:xfrm>
+        </p:spPr>
+      </p:pic>
+      <p:pic>
+        <p:nvPicPr>
+          <p:cNvPr id="5" name="Picture 4"/>
+          <p:cNvPicPr>
+            <a:picLocks noChangeAspect="1"/>
+          </p:cNvPicPr>
+          <p:nvPr/>
+        </p:nvPicPr>
+        <p:blipFill rotWithShape="1">
+          <a:blip r:embed="rId3">
+            <a:extLst>
+              <a:ext uri="{28A0092B-C50C-407E-A947-70E740481C1C}">
+                <a14:useLocalDpi xmlns:a14="http://schemas.microsoft.com/office/drawing/2010/main" val="0"/>
+              </a:ext>
+            </a:extLst>
+          </a:blip>
+          <a:srcRect r="12176"/>
+          <a:stretch/>
+        </p:blipFill>
+        <p:spPr>
+          <a:xfrm>
+            <a:off x="4755789" y="1217414"/>
+            <a:ext cx="6826611" cy="4814418"/>
+          </a:xfrm>
+          <a:prstGeom prst="rect">
+            <a:avLst/>
+          </a:prstGeom>
+        </p:spPr>
+      </p:pic>
     </p:spTree>
     <p:extLst>
       <p:ext uri="{BB962C8B-B14F-4D97-AF65-F5344CB8AC3E}">
@@ -8926,7 +9043,6 @@
               <a:rPr lang="en-US" dirty="0" smtClean="0"/>
               <a:t>The bit in a binary number with the highest value.</a:t>
             </a:r>
-            <a:endParaRPr lang="en-US" dirty="0" smtClean="0"/>
           </a:p>
           <a:p>
             <a:pPr marL="0" indent="0">

</xml_diff>